<commit_message>
Pls see revision log in TKB
</commit_message>
<xml_diff>
--- a/ServiceInteractions/riv/clinicalprocess/activityprescription/actoutcome/trunk/docs/TD_activityprescription_actoutcome.pptx
+++ b/ServiceInteractions/riv/clinicalprocess/activityprescription/actoutcome/trunk/docs/TD_activityprescription_actoutcome.pptx
@@ -206,7 +206,7 @@
             <a:fld id="{A1CCCE65-3320-6145-9FE0-1D4F0AE2F80D}" type="datetimeFigureOut">
               <a:rPr lang="sv-SE" smtClean="0"/>
               <a:pPr/>
-              <a:t>2013-06-02</a:t>
+              <a:t>2013-10-21</a:t>
             </a:fld>
             <a:endParaRPr lang="sv-SE"/>
           </a:p>
@@ -373,7 +373,7 @@
             <a:fld id="{48064D6E-32A5-4333-B2C8-253366DFFB1E}" type="datetimeFigureOut">
               <a:rPr lang="sv-SE" smtClean="0"/>
               <a:pPr/>
-              <a:t>2013-06-02</a:t>
+              <a:t>2013-10-21</a:t>
             </a:fld>
             <a:endParaRPr lang="sv-SE"/>
           </a:p>
@@ -810,7 +810,7 @@
             <a:fld id="{793AEFA7-59BA-446D-B708-A2D615D75329}" type="datetimeFigureOut">
               <a:rPr lang="sv-SE" smtClean="0"/>
               <a:pPr defTabSz="895350"/>
-              <a:t>2013-06-02</a:t>
+              <a:t>2013-10-21</a:t>
             </a:fld>
             <a:r>
               <a:rPr lang="sv-SE" dirty="0" smtClean="0"/>
@@ -1285,7 +1285,7 @@
             <a:fld id="{793AEFA7-59BA-446D-B708-A2D615D75329}" type="datetimeFigureOut">
               <a:rPr lang="sv-SE" smtClean="0"/>
               <a:pPr defTabSz="895350"/>
-              <a:t>2013-06-02</a:t>
+              <a:t>2013-10-21</a:t>
             </a:fld>
             <a:r>
               <a:rPr lang="sv-SE" dirty="0" smtClean="0"/>
@@ -1743,7 +1743,7 @@
             <a:fld id="{793AEFA7-59BA-446D-B708-A2D615D75329}" type="datetimeFigureOut">
               <a:rPr lang="sv-SE" smtClean="0"/>
               <a:pPr defTabSz="895350"/>
-              <a:t>2013-06-02</a:t>
+              <a:t>2013-10-21</a:t>
             </a:fld>
             <a:r>
               <a:rPr lang="sv-SE" dirty="0" smtClean="0"/>
@@ -1952,7 +1952,7 @@
             <a:fld id="{793AEFA7-59BA-446D-B708-A2D615D75329}" type="datetimeFigureOut">
               <a:rPr lang="sv-SE" smtClean="0"/>
               <a:pPr defTabSz="895350"/>
-              <a:t>2013-06-02</a:t>
+              <a:t>2013-10-21</a:t>
             </a:fld>
             <a:r>
               <a:rPr lang="sv-SE" dirty="0" smtClean="0"/>
@@ -2180,7 +2180,7 @@
             <a:fld id="{793AEFA7-59BA-446D-B708-A2D615D75329}" type="datetimeFigureOut">
               <a:rPr lang="sv-SE" smtClean="0"/>
               <a:pPr defTabSz="895350"/>
-              <a:t>2013-06-02</a:t>
+              <a:t>2013-10-21</a:t>
             </a:fld>
             <a:r>
               <a:rPr lang="sv-SE" dirty="0" smtClean="0"/>
@@ -2575,7 +2575,7 @@
             <a:fld id="{793AEFA7-59BA-446D-B708-A2D615D75329}" type="datetimeFigureOut">
               <a:rPr lang="sv-SE" smtClean="0"/>
               <a:pPr defTabSz="895350"/>
-              <a:t>2013-06-02</a:t>
+              <a:t>2013-10-21</a:t>
             </a:fld>
             <a:r>
               <a:rPr lang="sv-SE" dirty="0" smtClean="0"/>
@@ -3058,7 +3058,7 @@
             <a:fld id="{793AEFA7-59BA-446D-B708-A2D615D75329}" type="datetimeFigureOut">
               <a:rPr lang="sv-SE" smtClean="0"/>
               <a:pPr/>
-              <a:t>2013-06-02</a:t>
+              <a:t>2013-10-21</a:t>
             </a:fld>
             <a:endParaRPr lang="sv-SE" dirty="0"/>
           </a:p>
@@ -3568,7 +3568,7 @@
             <a:fld id="{1557CB54-6EE6-4E9A-A5F4-26576EC193CD}" type="datetimeFigureOut">
               <a:rPr lang="sv-SE" smtClean="0"/>
               <a:pPr/>
-              <a:t>2013-06-02</a:t>
+              <a:t>2013-10-21</a:t>
             </a:fld>
             <a:endParaRPr lang="sv-SE"/>
           </a:p>
@@ -4175,7 +4175,7 @@
             <a:fld id="{793AEFA7-59BA-446D-B708-A2D615D75329}" type="datetimeFigureOut">
               <a:rPr lang="sv-SE" smtClean="0"/>
               <a:pPr defTabSz="895350"/>
-              <a:t>2013-06-02</a:t>
+              <a:t>2013-10-21</a:t>
             </a:fld>
             <a:r>
               <a:rPr lang="sv-SE" smtClean="0"/>
@@ -6516,7 +6516,7 @@
             <a:solidFill>
               <a:srgbClr val="003468"/>
             </a:solidFill>
-            <a:prstDash val="solid"/>
+            <a:prstDash val="dash"/>
             <a:round/>
             <a:headEnd type="none" w="med" len="med"/>
             <a:tailEnd type="none" w="med" len="med"/>
@@ -6583,6 +6583,7 @@
             <a:solidFill>
               <a:srgbClr val="003468"/>
             </a:solidFill>
+            <a:prstDash val="dash"/>
             <a:round/>
             <a:headEnd type="triangle" w="med" len="med"/>
             <a:tailEnd type="oval" w="med" len="med"/>
@@ -6619,6 +6620,7 @@
             <a:solidFill>
               <a:schemeClr val="tx1"/>
             </a:solidFill>
+            <a:prstDash val="dash"/>
             <a:miter lim="800000"/>
             <a:headEnd/>
             <a:tailEnd/>
@@ -9822,7 +9824,7 @@
             <a:solidFill>
               <a:srgbClr val="003468"/>
             </a:solidFill>
-            <a:prstDash val="solid"/>
+            <a:prstDash val="dash"/>
             <a:round/>
             <a:headEnd type="none" w="med" len="med"/>
             <a:tailEnd type="none" w="med" len="med"/>
@@ -9889,6 +9891,7 @@
             <a:solidFill>
               <a:srgbClr val="003468"/>
             </a:solidFill>
+            <a:prstDash val="dash"/>
             <a:round/>
             <a:headEnd type="triangle" w="med" len="med"/>
             <a:tailEnd type="oval" w="med" len="med"/>
@@ -9925,6 +9928,7 @@
             <a:solidFill>
               <a:schemeClr val="tx1"/>
             </a:solidFill>
+            <a:prstDash val="dash"/>
             <a:miter lim="800000"/>
             <a:headEnd/>
             <a:tailEnd/>
@@ -12213,75 +12217,6 @@
       </p:sp>
       <p:sp>
         <p:nvSpPr>
-          <p:cNvPr id="20" name="Rektangel 19"/>
-          <p:cNvSpPr/>
-          <p:nvPr/>
-        </p:nvSpPr>
-        <p:spPr bwMode="auto">
-          <a:xfrm>
-            <a:off x="929891" y="3861048"/>
-            <a:ext cx="8124317" cy="241023"/>
-          </a:xfrm>
-          <a:prstGeom prst="rect">
-            <a:avLst/>
-          </a:prstGeom>
-          <a:solidFill>
-            <a:schemeClr val="accent1">
-              <a:lumMod val="20000"/>
-              <a:lumOff val="80000"/>
-            </a:schemeClr>
-          </a:solidFill>
-          <a:ln w="9525" cap="flat" cmpd="sng" algn="ctr">
-            <a:solidFill>
-              <a:srgbClr val="003468"/>
-            </a:solidFill>
-            <a:prstDash val="solid"/>
-            <a:round/>
-            <a:headEnd type="none" w="med" len="med"/>
-            <a:tailEnd type="none" w="med" len="med"/>
-          </a:ln>
-          <a:effectLst/>
-        </p:spPr>
-        <p:txBody>
-          <a:bodyPr wrap="none" lIns="63898" tIns="31949" rIns="63898" bIns="31949" anchor="ctr"/>
-          <a:lstStyle/>
-          <a:p>
-            <a:pPr eaLnBrk="0" hangingPunct="0">
-              <a:spcBef>
-                <a:spcPct val="50000"/>
-              </a:spcBef>
-              <a:defRPr/>
-            </a:pPr>
-            <a:r>
-              <a:rPr lang="en-GB" sz="1000" dirty="0" smtClean="0">
-                <a:latin typeface="Verdana" pitchFamily="34" charset="0"/>
-                <a:ea typeface="Geneva" pitchFamily="1" charset="-128"/>
-              </a:rPr>
-              <a:t>(</a:t>
-            </a:r>
-            <a:r>
-              <a:rPr lang="en-GB" sz="1000" dirty="0" err="1" smtClean="0">
-                <a:latin typeface="Verdana" pitchFamily="34" charset="0"/>
-                <a:ea typeface="Geneva" pitchFamily="1" charset="-128"/>
-              </a:rPr>
-              <a:t>Anslutningskatalog</a:t>
-            </a:r>
-            <a:r>
-              <a:rPr lang="en-GB" sz="1000" dirty="0" smtClean="0">
-                <a:latin typeface="Verdana" pitchFamily="34" charset="0"/>
-                <a:ea typeface="Geneva" pitchFamily="1" charset="-128"/>
-              </a:rPr>
-              <a:t>)</a:t>
-            </a:r>
-            <a:endParaRPr lang="en-GB" sz="1000" dirty="0">
-              <a:latin typeface="Verdana" pitchFamily="34" charset="0"/>
-              <a:ea typeface="Geneva" pitchFamily="1" charset="-128"/>
-            </a:endParaRPr>
-          </a:p>
-        </p:txBody>
-      </p:sp>
-      <p:sp>
-        <p:nvSpPr>
           <p:cNvPr id="22" name="Rektangel 21"/>
           <p:cNvSpPr/>
           <p:nvPr/>
@@ -13541,7 +13476,7 @@
             <a:fld id="{793AEFA7-59BA-446D-B708-A2D615D75329}" type="datetimeFigureOut">
               <a:rPr lang="sv-SE" smtClean="0"/>
               <a:pPr defTabSz="895350"/>
-              <a:t>2013-06-02</a:t>
+              <a:t>2013-10-21</a:t>
             </a:fld>
             <a:r>
               <a:rPr lang="sv-SE" smtClean="0"/>
@@ -16016,7 +15951,7 @@
             <a:fld id="{793AEFA7-59BA-446D-B708-A2D615D75329}" type="datetimeFigureOut">
               <a:rPr lang="sv-SE" smtClean="0"/>
               <a:pPr defTabSz="895350"/>
-              <a:t>2013-06-02</a:t>
+              <a:t>2013-10-21</a:t>
             </a:fld>
             <a:r>
               <a:rPr lang="sv-SE" smtClean="0"/>
@@ -17818,7 +17753,7 @@
             <a:fld id="{793AEFA7-59BA-446D-B708-A2D615D75329}" type="datetimeFigureOut">
               <a:rPr lang="sv-SE" smtClean="0"/>
               <a:pPr defTabSz="895350"/>
-              <a:t>2013-06-02</a:t>
+              <a:t>2013-10-21</a:t>
             </a:fld>
             <a:r>
               <a:rPr lang="sv-SE" smtClean="0"/>
@@ -20148,7 +20083,7 @@
             <a:fld id="{793AEFA7-59BA-446D-B708-A2D615D75329}" type="datetimeFigureOut">
               <a:rPr lang="sv-SE" smtClean="0"/>
               <a:pPr defTabSz="895350"/>
-              <a:t>2013-06-02</a:t>
+              <a:t>2013-10-21</a:t>
             </a:fld>
             <a:r>
               <a:rPr lang="sv-SE" smtClean="0"/>

</xml_diff>